<commit_message>
Week 10 commit, Updated project desription.
</commit_message>
<xml_diff>
--- a/Independent study_final_presentation.pptx
+++ b/Independent study_final_presentation.pptx
@@ -4,16 +4,22 @@
   <p:sldMasterIdLst>
     <p:sldMasterId id="2147483686" r:id="rId1"/>
   </p:sldMasterIdLst>
+  <p:notesMasterIdLst>
+    <p:notesMasterId r:id="rId14"/>
+  </p:notesMasterIdLst>
   <p:sldIdLst>
     <p:sldId id="256" r:id="rId2"/>
     <p:sldId id="257" r:id="rId3"/>
-    <p:sldId id="262" r:id="rId4"/>
-    <p:sldId id="258" r:id="rId5"/>
-    <p:sldId id="259" r:id="rId6"/>
-    <p:sldId id="260" r:id="rId7"/>
-    <p:sldId id="261" r:id="rId8"/>
-    <p:sldId id="263" r:id="rId9"/>
-    <p:sldId id="264" r:id="rId10"/>
+    <p:sldId id="265" r:id="rId4"/>
+    <p:sldId id="266" r:id="rId5"/>
+    <p:sldId id="267" r:id="rId6"/>
+    <p:sldId id="262" r:id="rId7"/>
+    <p:sldId id="269" r:id="rId8"/>
+    <p:sldId id="268" r:id="rId9"/>
+    <p:sldId id="270" r:id="rId10"/>
+    <p:sldId id="271" r:id="rId11"/>
+    <p:sldId id="263" r:id="rId12"/>
+    <p:sldId id="264" r:id="rId13"/>
   </p:sldIdLst>
   <p:sldSz cx="12192000" cy="6858000"/>
   <p:notesSz cx="6858000" cy="9144000"/>
@@ -112,7 +118,520 @@
       </a:defRPr>
     </a:lvl9pPr>
   </p:defaultTextStyle>
+  <p:extLst>
+    <p:ext uri="{521415D9-36F7-43E2-AB2F-B90AF26B5E84}">
+      <p14:sectionLst xmlns:p14="http://schemas.microsoft.com/office/powerpoint/2010/main">
+        <p14:section name="Introduction" id="{77F3F84C-6682-4DC4-B6F6-FDAF0D38F5B6}">
+          <p14:sldIdLst>
+            <p14:sldId id="256"/>
+            <p14:sldId id="257"/>
+          </p14:sldIdLst>
+        </p14:section>
+        <p14:section name="Approaching media files as arrays" id="{36E2C644-7965-4F94-B563-593E574B0FA4}">
+          <p14:sldIdLst>
+            <p14:sldId id="265"/>
+            <p14:sldId id="266"/>
+            <p14:sldId id="267"/>
+            <p14:sldId id="262"/>
+          </p14:sldIdLst>
+        </p14:section>
+        <p14:section name="Examples" id="{A8C64A3D-20FB-42D1-A07E-820E57587042}">
+          <p14:sldIdLst>
+            <p14:sldId id="269"/>
+            <p14:sldId id="268"/>
+            <p14:sldId id="270"/>
+            <p14:sldId id="271"/>
+          </p14:sldIdLst>
+        </p14:section>
+        <p14:section name="Using my code" id="{3A25350A-0F5A-447D-A4E5-C48498C10894}">
+          <p14:sldIdLst>
+            <p14:sldId id="263"/>
+            <p14:sldId id="264"/>
+          </p14:sldIdLst>
+        </p14:section>
+      </p14:sectionLst>
+    </p:ext>
+  </p:extLst>
 </p:presentation>
+</file>
+
+<file path=ppt/notesMasters/notesMaster1.xml><?xml version="1.0" encoding="utf-8"?>
+<p:notesMaster xmlns:a="http://schemas.openxmlformats.org/drawingml/2006/main" xmlns:r="http://schemas.openxmlformats.org/officeDocument/2006/relationships" xmlns:p="http://schemas.openxmlformats.org/presentationml/2006/main">
+  <p:cSld>
+    <p:bg>
+      <p:bgRef idx="1001">
+        <a:schemeClr val="bg1"/>
+      </p:bgRef>
+    </p:bg>
+    <p:spTree>
+      <p:nvGrpSpPr>
+        <p:cNvPr id="1" name=""/>
+        <p:cNvGrpSpPr/>
+        <p:nvPr/>
+      </p:nvGrpSpPr>
+      <p:grpSpPr>
+        <a:xfrm>
+          <a:off x="0" y="0"/>
+          <a:ext cx="0" cy="0"/>
+          <a:chOff x="0" y="0"/>
+          <a:chExt cx="0" cy="0"/>
+        </a:xfrm>
+      </p:grpSpPr>
+      <p:sp>
+        <p:nvSpPr>
+          <p:cNvPr id="2" name="Header Placeholder 1"/>
+          <p:cNvSpPr>
+            <a:spLocks noGrp="1"/>
+          </p:cNvSpPr>
+          <p:nvPr>
+            <p:ph type="hdr" sz="quarter"/>
+          </p:nvPr>
+        </p:nvSpPr>
+        <p:spPr>
+          <a:xfrm>
+            <a:off x="0" y="0"/>
+            <a:ext cx="2971800" cy="458788"/>
+          </a:xfrm>
+          <a:prstGeom prst="rect">
+            <a:avLst/>
+          </a:prstGeom>
+        </p:spPr>
+        <p:txBody>
+          <a:bodyPr vert="horz" lIns="91440" tIns="45720" rIns="91440" bIns="45720" rtlCol="0"/>
+          <a:lstStyle>
+            <a:lvl1pPr algn="l">
+              <a:defRPr sz="1200"/>
+            </a:lvl1pPr>
+          </a:lstStyle>
+          <a:p>
+            <a:endParaRPr lang="en-GB"/>
+          </a:p>
+        </p:txBody>
+      </p:sp>
+      <p:sp>
+        <p:nvSpPr>
+          <p:cNvPr id="3" name="Date Placeholder 2"/>
+          <p:cNvSpPr>
+            <a:spLocks noGrp="1"/>
+          </p:cNvSpPr>
+          <p:nvPr>
+            <p:ph type="dt" idx="1"/>
+          </p:nvPr>
+        </p:nvSpPr>
+        <p:spPr>
+          <a:xfrm>
+            <a:off x="3884613" y="0"/>
+            <a:ext cx="2971800" cy="458788"/>
+          </a:xfrm>
+          <a:prstGeom prst="rect">
+            <a:avLst/>
+          </a:prstGeom>
+        </p:spPr>
+        <p:txBody>
+          <a:bodyPr vert="horz" lIns="91440" tIns="45720" rIns="91440" bIns="45720" rtlCol="0"/>
+          <a:lstStyle>
+            <a:lvl1pPr algn="r">
+              <a:defRPr sz="1200"/>
+            </a:lvl1pPr>
+          </a:lstStyle>
+          <a:p>
+            <a:fld id="{C09824F0-4E96-49F7-BFEF-301A5BD32299}" type="datetimeFigureOut">
+              <a:rPr lang="en-GB" smtClean="0"/>
+              <a:t>18/11/2021</a:t>
+            </a:fld>
+            <a:endParaRPr lang="en-GB"/>
+          </a:p>
+        </p:txBody>
+      </p:sp>
+      <p:sp>
+        <p:nvSpPr>
+          <p:cNvPr id="4" name="Slide Image Placeholder 3"/>
+          <p:cNvSpPr>
+            <a:spLocks noGrp="1" noRot="1" noChangeAspect="1"/>
+          </p:cNvSpPr>
+          <p:nvPr>
+            <p:ph type="sldImg" idx="2"/>
+          </p:nvPr>
+        </p:nvSpPr>
+        <p:spPr>
+          <a:xfrm>
+            <a:off x="685800" y="1143000"/>
+            <a:ext cx="5486400" cy="3086100"/>
+          </a:xfrm>
+          <a:prstGeom prst="rect">
+            <a:avLst/>
+          </a:prstGeom>
+          <a:noFill/>
+          <a:ln w="12700">
+            <a:solidFill>
+              <a:prstClr val="black"/>
+            </a:solidFill>
+          </a:ln>
+        </p:spPr>
+        <p:txBody>
+          <a:bodyPr vert="horz" lIns="91440" tIns="45720" rIns="91440" bIns="45720" rtlCol="0" anchor="ctr"/>
+          <a:lstStyle/>
+          <a:p>
+            <a:endParaRPr lang="en-GB"/>
+          </a:p>
+        </p:txBody>
+      </p:sp>
+      <p:sp>
+        <p:nvSpPr>
+          <p:cNvPr id="5" name="Notes Placeholder 4"/>
+          <p:cNvSpPr>
+            <a:spLocks noGrp="1"/>
+          </p:cNvSpPr>
+          <p:nvPr>
+            <p:ph type="body" sz="quarter" idx="3"/>
+          </p:nvPr>
+        </p:nvSpPr>
+        <p:spPr>
+          <a:xfrm>
+            <a:off x="685800" y="4400550"/>
+            <a:ext cx="5486400" cy="3600450"/>
+          </a:xfrm>
+          <a:prstGeom prst="rect">
+            <a:avLst/>
+          </a:prstGeom>
+        </p:spPr>
+        <p:txBody>
+          <a:bodyPr vert="horz" lIns="91440" tIns="45720" rIns="91440" bIns="45720" rtlCol="0"/>
+          <a:lstStyle/>
+          <a:p>
+            <a:pPr lvl="0"/>
+            <a:r>
+              <a:rPr lang="en-US"/>
+              <a:t>Click to edit Master text styles</a:t>
+            </a:r>
+          </a:p>
+          <a:p>
+            <a:pPr lvl="1"/>
+            <a:r>
+              <a:rPr lang="en-US"/>
+              <a:t>Second level</a:t>
+            </a:r>
+          </a:p>
+          <a:p>
+            <a:pPr lvl="2"/>
+            <a:r>
+              <a:rPr lang="en-US"/>
+              <a:t>Third level</a:t>
+            </a:r>
+          </a:p>
+          <a:p>
+            <a:pPr lvl="3"/>
+            <a:r>
+              <a:rPr lang="en-US"/>
+              <a:t>Fourth level</a:t>
+            </a:r>
+          </a:p>
+          <a:p>
+            <a:pPr lvl="4"/>
+            <a:r>
+              <a:rPr lang="en-US"/>
+              <a:t>Fifth level</a:t>
+            </a:r>
+            <a:endParaRPr lang="en-GB"/>
+          </a:p>
+        </p:txBody>
+      </p:sp>
+      <p:sp>
+        <p:nvSpPr>
+          <p:cNvPr id="6" name="Footer Placeholder 5"/>
+          <p:cNvSpPr>
+            <a:spLocks noGrp="1"/>
+          </p:cNvSpPr>
+          <p:nvPr>
+            <p:ph type="ftr" sz="quarter" idx="4"/>
+          </p:nvPr>
+        </p:nvSpPr>
+        <p:spPr>
+          <a:xfrm>
+            <a:off x="0" y="8685213"/>
+            <a:ext cx="2971800" cy="458787"/>
+          </a:xfrm>
+          <a:prstGeom prst="rect">
+            <a:avLst/>
+          </a:prstGeom>
+        </p:spPr>
+        <p:txBody>
+          <a:bodyPr vert="horz" lIns="91440" tIns="45720" rIns="91440" bIns="45720" rtlCol="0" anchor="b"/>
+          <a:lstStyle>
+            <a:lvl1pPr algn="l">
+              <a:defRPr sz="1200"/>
+            </a:lvl1pPr>
+          </a:lstStyle>
+          <a:p>
+            <a:endParaRPr lang="en-GB"/>
+          </a:p>
+        </p:txBody>
+      </p:sp>
+      <p:sp>
+        <p:nvSpPr>
+          <p:cNvPr id="7" name="Slide Number Placeholder 6"/>
+          <p:cNvSpPr>
+            <a:spLocks noGrp="1"/>
+          </p:cNvSpPr>
+          <p:nvPr>
+            <p:ph type="sldNum" sz="quarter" idx="5"/>
+          </p:nvPr>
+        </p:nvSpPr>
+        <p:spPr>
+          <a:xfrm>
+            <a:off x="3884613" y="8685213"/>
+            <a:ext cx="2971800" cy="458787"/>
+          </a:xfrm>
+          <a:prstGeom prst="rect">
+            <a:avLst/>
+          </a:prstGeom>
+        </p:spPr>
+        <p:txBody>
+          <a:bodyPr vert="horz" lIns="91440" tIns="45720" rIns="91440" bIns="45720" rtlCol="0" anchor="b"/>
+          <a:lstStyle>
+            <a:lvl1pPr algn="r">
+              <a:defRPr sz="1200"/>
+            </a:lvl1pPr>
+          </a:lstStyle>
+          <a:p>
+            <a:fld id="{82F2C11E-84FE-4E88-BDA4-9856EFC8F8A7}" type="slidenum">
+              <a:rPr lang="en-GB" smtClean="0"/>
+              <a:t>‹#›</a:t>
+            </a:fld>
+            <a:endParaRPr lang="en-GB"/>
+          </a:p>
+        </p:txBody>
+      </p:sp>
+    </p:spTree>
+    <p:extLst>
+      <p:ext uri="{BB962C8B-B14F-4D97-AF65-F5344CB8AC3E}">
+        <p14:creationId xmlns:p14="http://schemas.microsoft.com/office/powerpoint/2010/main" val="298395686"/>
+      </p:ext>
+    </p:extLst>
+  </p:cSld>
+  <p:clrMap bg1="lt1" tx1="dk1" bg2="lt2" tx2="dk2" accent1="accent1" accent2="accent2" accent3="accent3" accent4="accent4" accent5="accent5" accent6="accent6" hlink="hlink" folHlink="folHlink"/>
+  <p:notesStyle>
+    <a:lvl1pPr marL="0" algn="l" defTabSz="914400" rtl="0" eaLnBrk="1" latinLnBrk="0" hangingPunct="1">
+      <a:defRPr sz="1200" kern="1200">
+        <a:solidFill>
+          <a:schemeClr val="tx1"/>
+        </a:solidFill>
+        <a:latin typeface="+mn-lt"/>
+        <a:ea typeface="+mn-ea"/>
+        <a:cs typeface="+mn-cs"/>
+      </a:defRPr>
+    </a:lvl1pPr>
+    <a:lvl2pPr marL="457200" algn="l" defTabSz="914400" rtl="0" eaLnBrk="1" latinLnBrk="0" hangingPunct="1">
+      <a:defRPr sz="1200" kern="1200">
+        <a:solidFill>
+          <a:schemeClr val="tx1"/>
+        </a:solidFill>
+        <a:latin typeface="+mn-lt"/>
+        <a:ea typeface="+mn-ea"/>
+        <a:cs typeface="+mn-cs"/>
+      </a:defRPr>
+    </a:lvl2pPr>
+    <a:lvl3pPr marL="914400" algn="l" defTabSz="914400" rtl="0" eaLnBrk="1" latinLnBrk="0" hangingPunct="1">
+      <a:defRPr sz="1200" kern="1200">
+        <a:solidFill>
+          <a:schemeClr val="tx1"/>
+        </a:solidFill>
+        <a:latin typeface="+mn-lt"/>
+        <a:ea typeface="+mn-ea"/>
+        <a:cs typeface="+mn-cs"/>
+      </a:defRPr>
+    </a:lvl3pPr>
+    <a:lvl4pPr marL="1371600" algn="l" defTabSz="914400" rtl="0" eaLnBrk="1" latinLnBrk="0" hangingPunct="1">
+      <a:defRPr sz="1200" kern="1200">
+        <a:solidFill>
+          <a:schemeClr val="tx1"/>
+        </a:solidFill>
+        <a:latin typeface="+mn-lt"/>
+        <a:ea typeface="+mn-ea"/>
+        <a:cs typeface="+mn-cs"/>
+      </a:defRPr>
+    </a:lvl4pPr>
+    <a:lvl5pPr marL="1828800" algn="l" defTabSz="914400" rtl="0" eaLnBrk="1" latinLnBrk="0" hangingPunct="1">
+      <a:defRPr sz="1200" kern="1200">
+        <a:solidFill>
+          <a:schemeClr val="tx1"/>
+        </a:solidFill>
+        <a:latin typeface="+mn-lt"/>
+        <a:ea typeface="+mn-ea"/>
+        <a:cs typeface="+mn-cs"/>
+      </a:defRPr>
+    </a:lvl5pPr>
+    <a:lvl6pPr marL="2286000" algn="l" defTabSz="914400" rtl="0" eaLnBrk="1" latinLnBrk="0" hangingPunct="1">
+      <a:defRPr sz="1200" kern="1200">
+        <a:solidFill>
+          <a:schemeClr val="tx1"/>
+        </a:solidFill>
+        <a:latin typeface="+mn-lt"/>
+        <a:ea typeface="+mn-ea"/>
+        <a:cs typeface="+mn-cs"/>
+      </a:defRPr>
+    </a:lvl6pPr>
+    <a:lvl7pPr marL="2743200" algn="l" defTabSz="914400" rtl="0" eaLnBrk="1" latinLnBrk="0" hangingPunct="1">
+      <a:defRPr sz="1200" kern="1200">
+        <a:solidFill>
+          <a:schemeClr val="tx1"/>
+        </a:solidFill>
+        <a:latin typeface="+mn-lt"/>
+        <a:ea typeface="+mn-ea"/>
+        <a:cs typeface="+mn-cs"/>
+      </a:defRPr>
+    </a:lvl7pPr>
+    <a:lvl8pPr marL="3200400" algn="l" defTabSz="914400" rtl="0" eaLnBrk="1" latinLnBrk="0" hangingPunct="1">
+      <a:defRPr sz="1200" kern="1200">
+        <a:solidFill>
+          <a:schemeClr val="tx1"/>
+        </a:solidFill>
+        <a:latin typeface="+mn-lt"/>
+        <a:ea typeface="+mn-ea"/>
+        <a:cs typeface="+mn-cs"/>
+      </a:defRPr>
+    </a:lvl8pPr>
+    <a:lvl9pPr marL="3657600" algn="l" defTabSz="914400" rtl="0" eaLnBrk="1" latinLnBrk="0" hangingPunct="1">
+      <a:defRPr sz="1200" kern="1200">
+        <a:solidFill>
+          <a:schemeClr val="tx1"/>
+        </a:solidFill>
+        <a:latin typeface="+mn-lt"/>
+        <a:ea typeface="+mn-ea"/>
+        <a:cs typeface="+mn-cs"/>
+      </a:defRPr>
+    </a:lvl9pPr>
+  </p:notesStyle>
+</p:notesMaster>
+</file>
+
+<file path=ppt/notesSlides/notesSlide1.xml><?xml version="1.0" encoding="utf-8"?>
+<p:notes xmlns:a="http://schemas.openxmlformats.org/drawingml/2006/main" xmlns:r="http://schemas.openxmlformats.org/officeDocument/2006/relationships" xmlns:p="http://schemas.openxmlformats.org/presentationml/2006/main">
+  <p:cSld>
+    <p:spTree>
+      <p:nvGrpSpPr>
+        <p:cNvPr id="1" name=""/>
+        <p:cNvGrpSpPr/>
+        <p:nvPr/>
+      </p:nvGrpSpPr>
+      <p:grpSpPr>
+        <a:xfrm>
+          <a:off x="0" y="0"/>
+          <a:ext cx="0" cy="0"/>
+          <a:chOff x="0" y="0"/>
+          <a:chExt cx="0" cy="0"/>
+        </a:xfrm>
+      </p:grpSpPr>
+      <p:sp>
+        <p:nvSpPr>
+          <p:cNvPr id="2" name="Slide Image Placeholder 1"/>
+          <p:cNvSpPr>
+            <a:spLocks noGrp="1" noRot="1" noChangeAspect="1"/>
+          </p:cNvSpPr>
+          <p:nvPr>
+            <p:ph type="sldImg"/>
+          </p:nvPr>
+        </p:nvSpPr>
+        <p:spPr/>
+      </p:sp>
+      <p:sp>
+        <p:nvSpPr>
+          <p:cNvPr id="3" name="Notes Placeholder 2"/>
+          <p:cNvSpPr>
+            <a:spLocks noGrp="1"/>
+          </p:cNvSpPr>
+          <p:nvPr>
+            <p:ph type="body" idx="1"/>
+          </p:nvPr>
+        </p:nvSpPr>
+        <p:spPr/>
+        <p:txBody>
+          <a:bodyPr/>
+          <a:lstStyle/>
+          <a:p>
+            <a:pPr marL="0" marR="0" lvl="0" indent="0" algn="l" defTabSz="914400" rtl="0" eaLnBrk="1" fontAlgn="auto" latinLnBrk="0" hangingPunct="1">
+              <a:lnSpc>
+                <a:spcPct val="100000"/>
+              </a:lnSpc>
+              <a:spcBef>
+                <a:spcPts val="0"/>
+              </a:spcBef>
+              <a:spcAft>
+                <a:spcPts val="0"/>
+              </a:spcAft>
+              <a:buClrTx/>
+              <a:buSzTx/>
+              <a:buFontTx/>
+              <a:buNone/>
+              <a:tabLst/>
+              <a:defRPr/>
+            </a:pPr>
+            <a:r>
+              <a:rPr lang="en-GB" dirty="0"/>
+              <a:t>To facilitate the task of working with image, audio, and video data in python, I have compiled a list of convenience functions into a package called </a:t>
+            </a:r>
+            <a:r>
+              <a:rPr lang="en-US" b="0" dirty="0">
+                <a:latin typeface="Consolas" panose="020B0609020204030204" pitchFamily="49" charset="0"/>
+              </a:rPr>
+              <a:t>`</a:t>
+            </a:r>
+            <a:r>
+              <a:rPr lang="en-US" b="0" dirty="0" err="1">
+                <a:latin typeface="Consolas" panose="020B0609020204030204" pitchFamily="49" charset="0"/>
+              </a:rPr>
+              <a:t>media_tools</a:t>
+            </a:r>
+            <a:r>
+              <a:rPr lang="en-US" b="0" dirty="0">
+                <a:latin typeface="Consolas" panose="020B0609020204030204" pitchFamily="49" charset="0"/>
+              </a:rPr>
+              <a:t>`</a:t>
+            </a:r>
+            <a:r>
+              <a:rPr lang="en-GB" dirty="0"/>
+              <a:t>, which allows for a number of media manipulation and generation approaches.</a:t>
+            </a:r>
+          </a:p>
+          <a:p>
+            <a:endParaRPr lang="en-GB" dirty="0"/>
+          </a:p>
+        </p:txBody>
+      </p:sp>
+      <p:sp>
+        <p:nvSpPr>
+          <p:cNvPr id="4" name="Slide Number Placeholder 3"/>
+          <p:cNvSpPr>
+            <a:spLocks noGrp="1"/>
+          </p:cNvSpPr>
+          <p:nvPr>
+            <p:ph type="sldNum" sz="quarter" idx="5"/>
+          </p:nvPr>
+        </p:nvSpPr>
+        <p:spPr/>
+        <p:txBody>
+          <a:bodyPr/>
+          <a:lstStyle/>
+          <a:p>
+            <a:fld id="{82F2C11E-84FE-4E88-BDA4-9856EFC8F8A7}" type="slidenum">
+              <a:rPr lang="en-GB" smtClean="0"/>
+              <a:t>6</a:t>
+            </a:fld>
+            <a:endParaRPr lang="en-GB"/>
+          </a:p>
+        </p:txBody>
+      </p:sp>
+    </p:spTree>
+    <p:extLst>
+      <p:ext uri="{BB962C8B-B14F-4D97-AF65-F5344CB8AC3E}">
+        <p14:creationId xmlns:p14="http://schemas.microsoft.com/office/powerpoint/2010/main" val="1346884896"/>
+      </p:ext>
+    </p:extLst>
+  </p:cSld>
+  <p:clrMapOvr>
+    <a:masterClrMapping/>
+  </p:clrMapOvr>
+</p:notes>
 </file>
 
 <file path=ppt/slideLayouts/slideLayout1.xml><?xml version="1.0" encoding="utf-8"?>
@@ -7383,6 +7902,316 @@
 </p:sld>
 </file>
 
+<file path=ppt/slides/slide10.xml><?xml version="1.0" encoding="utf-8"?>
+<p:sld xmlns:a="http://schemas.openxmlformats.org/drawingml/2006/main" xmlns:r="http://schemas.openxmlformats.org/officeDocument/2006/relationships" xmlns:p="http://schemas.openxmlformats.org/presentationml/2006/main">
+  <p:cSld>
+    <p:spTree>
+      <p:nvGrpSpPr>
+        <p:cNvPr id="1" name=""/>
+        <p:cNvGrpSpPr/>
+        <p:nvPr/>
+      </p:nvGrpSpPr>
+      <p:grpSpPr>
+        <a:xfrm>
+          <a:off x="0" y="0"/>
+          <a:ext cx="0" cy="0"/>
+          <a:chOff x="0" y="0"/>
+          <a:chExt cx="0" cy="0"/>
+        </a:xfrm>
+      </p:grpSpPr>
+      <p:sp>
+        <p:nvSpPr>
+          <p:cNvPr id="2" name="Title 1">
+            <a:extLst>
+              <a:ext uri="{FF2B5EF4-FFF2-40B4-BE49-F238E27FC236}">
+                <a16:creationId xmlns:a16="http://schemas.microsoft.com/office/drawing/2014/main" id="{E1DDE2C7-1D55-4182-869F-2D2B8D8FE57C}"/>
+              </a:ext>
+            </a:extLst>
+          </p:cNvPr>
+          <p:cNvSpPr>
+            <a:spLocks noGrp="1"/>
+          </p:cNvSpPr>
+          <p:nvPr>
+            <p:ph type="title"/>
+          </p:nvPr>
+        </p:nvSpPr>
+        <p:spPr/>
+        <p:txBody>
+          <a:bodyPr/>
+          <a:lstStyle/>
+          <a:p>
+            <a:r>
+              <a:rPr lang="en-US" dirty="0"/>
+              <a:t>Generation</a:t>
+            </a:r>
+            <a:endParaRPr lang="en-GB" dirty="0"/>
+          </a:p>
+        </p:txBody>
+      </p:sp>
+      <p:sp>
+        <p:nvSpPr>
+          <p:cNvPr id="3" name="Content Placeholder 2">
+            <a:extLst>
+              <a:ext uri="{FF2B5EF4-FFF2-40B4-BE49-F238E27FC236}">
+                <a16:creationId xmlns:a16="http://schemas.microsoft.com/office/drawing/2014/main" id="{D24FA08C-8170-4C8F-ACBE-6CF712378BBB}"/>
+              </a:ext>
+            </a:extLst>
+          </p:cNvPr>
+          <p:cNvSpPr>
+            <a:spLocks noGrp="1"/>
+          </p:cNvSpPr>
+          <p:nvPr>
+            <p:ph idx="1"/>
+          </p:nvPr>
+        </p:nvSpPr>
+        <p:spPr/>
+        <p:txBody>
+          <a:bodyPr/>
+          <a:lstStyle/>
+          <a:p>
+            <a:endParaRPr lang="en-GB"/>
+          </a:p>
+        </p:txBody>
+      </p:sp>
+    </p:spTree>
+    <p:extLst>
+      <p:ext uri="{BB962C8B-B14F-4D97-AF65-F5344CB8AC3E}">
+        <p14:creationId xmlns:p14="http://schemas.microsoft.com/office/powerpoint/2010/main" val="1018127832"/>
+      </p:ext>
+    </p:extLst>
+  </p:cSld>
+  <p:clrMapOvr>
+    <a:masterClrMapping/>
+  </p:clrMapOvr>
+</p:sld>
+</file>
+
+<file path=ppt/slides/slide11.xml><?xml version="1.0" encoding="utf-8"?>
+<p:sld xmlns:a="http://schemas.openxmlformats.org/drawingml/2006/main" xmlns:r="http://schemas.openxmlformats.org/officeDocument/2006/relationships" xmlns:p="http://schemas.openxmlformats.org/presentationml/2006/main">
+  <p:cSld>
+    <p:spTree>
+      <p:nvGrpSpPr>
+        <p:cNvPr id="1" name=""/>
+        <p:cNvGrpSpPr/>
+        <p:nvPr/>
+      </p:nvGrpSpPr>
+      <p:grpSpPr>
+        <a:xfrm>
+          <a:off x="0" y="0"/>
+          <a:ext cx="0" cy="0"/>
+          <a:chOff x="0" y="0"/>
+          <a:chExt cx="0" cy="0"/>
+        </a:xfrm>
+      </p:grpSpPr>
+      <p:sp>
+        <p:nvSpPr>
+          <p:cNvPr id="2" name="Title 1">
+            <a:extLst>
+              <a:ext uri="{FF2B5EF4-FFF2-40B4-BE49-F238E27FC236}">
+                <a16:creationId xmlns:a16="http://schemas.microsoft.com/office/drawing/2014/main" id="{E527C3E5-100C-40BB-9777-6E78F264C1E7}"/>
+              </a:ext>
+            </a:extLst>
+          </p:cNvPr>
+          <p:cNvSpPr>
+            <a:spLocks noGrp="1"/>
+          </p:cNvSpPr>
+          <p:nvPr>
+            <p:ph type="title"/>
+          </p:nvPr>
+        </p:nvSpPr>
+        <p:spPr/>
+        <p:txBody>
+          <a:bodyPr/>
+          <a:lstStyle/>
+          <a:p>
+            <a:r>
+              <a:rPr lang="en-US" dirty="0"/>
+              <a:t>How to use this project yourself</a:t>
+            </a:r>
+            <a:endParaRPr lang="en-GB" dirty="0"/>
+          </a:p>
+        </p:txBody>
+      </p:sp>
+      <p:sp>
+        <p:nvSpPr>
+          <p:cNvPr id="3" name="Content Placeholder 2">
+            <a:extLst>
+              <a:ext uri="{FF2B5EF4-FFF2-40B4-BE49-F238E27FC236}">
+                <a16:creationId xmlns:a16="http://schemas.microsoft.com/office/drawing/2014/main" id="{78FEA772-4CF4-4DE2-84DD-725F4261C70C}"/>
+              </a:ext>
+            </a:extLst>
+          </p:cNvPr>
+          <p:cNvSpPr>
+            <a:spLocks noGrp="1"/>
+          </p:cNvSpPr>
+          <p:nvPr>
+            <p:ph idx="1"/>
+          </p:nvPr>
+        </p:nvSpPr>
+        <p:spPr/>
+        <p:txBody>
+          <a:bodyPr>
+            <a:normAutofit/>
+          </a:bodyPr>
+          <a:lstStyle/>
+          <a:p>
+            <a:pPr marL="342900" indent="-342900">
+              <a:buFont typeface="+mj-lt"/>
+              <a:buAutoNum type="arabicPeriod"/>
+            </a:pPr>
+            <a:r>
+              <a:rPr lang="en-GB" dirty="0"/>
+              <a:t>Download Python</a:t>
+            </a:r>
+          </a:p>
+          <a:p>
+            <a:pPr marL="342900" indent="-342900">
+              <a:buFont typeface="+mj-lt"/>
+              <a:buAutoNum type="arabicPeriod"/>
+            </a:pPr>
+            <a:r>
+              <a:rPr lang="en-GB" dirty="0"/>
+              <a:t>Head to </a:t>
+            </a:r>
+            <a:r>
+              <a:rPr lang="en-GB" dirty="0">
+                <a:hlinkClick r:id="rId2"/>
+              </a:rPr>
+              <a:t>https://github.com/phileasdg/Image_and_Audio_Generation_and_Editing_using_Python</a:t>
+            </a:r>
+            <a:r>
+              <a:rPr lang="en-GB" dirty="0"/>
+              <a:t> and download my code</a:t>
+            </a:r>
+          </a:p>
+          <a:p>
+            <a:pPr marL="342900" indent="-342900">
+              <a:buFont typeface="+mj-lt"/>
+              <a:buAutoNum type="arabicPeriod"/>
+            </a:pPr>
+            <a:r>
+              <a:rPr lang="en-GB" dirty="0"/>
+              <a:t>Install the dependencies using the command: </a:t>
+            </a:r>
+            <a:br>
+              <a:rPr lang="en-GB" dirty="0"/>
+            </a:br>
+            <a:r>
+              <a:rPr lang="en-US" dirty="0">
+                <a:latin typeface="Consolas" panose="020B0609020204030204" pitchFamily="49" charset="0"/>
+              </a:rPr>
+              <a:t>pip install -r requirements.txt</a:t>
+            </a:r>
+          </a:p>
+          <a:p>
+            <a:pPr marL="342900" indent="-342900">
+              <a:buFont typeface="+mj-lt"/>
+              <a:buAutoNum type="arabicPeriod"/>
+            </a:pPr>
+            <a:r>
+              <a:rPr lang="en-GB" dirty="0"/>
+              <a:t>Mess around and have fun!</a:t>
+            </a:r>
+          </a:p>
+        </p:txBody>
+      </p:sp>
+    </p:spTree>
+    <p:extLst>
+      <p:ext uri="{BB962C8B-B14F-4D97-AF65-F5344CB8AC3E}">
+        <p14:creationId xmlns:p14="http://schemas.microsoft.com/office/powerpoint/2010/main" val="307629117"/>
+      </p:ext>
+    </p:extLst>
+  </p:cSld>
+  <p:clrMapOvr>
+    <a:masterClrMapping/>
+  </p:clrMapOvr>
+</p:sld>
+</file>
+
+<file path=ppt/slides/slide12.xml><?xml version="1.0" encoding="utf-8"?>
+<p:sld xmlns:a="http://schemas.openxmlformats.org/drawingml/2006/main" xmlns:r="http://schemas.openxmlformats.org/officeDocument/2006/relationships" xmlns:p="http://schemas.openxmlformats.org/presentationml/2006/main">
+  <p:cSld>
+    <p:spTree>
+      <p:nvGrpSpPr>
+        <p:cNvPr id="1" name=""/>
+        <p:cNvGrpSpPr/>
+        <p:nvPr/>
+      </p:nvGrpSpPr>
+      <p:grpSpPr>
+        <a:xfrm>
+          <a:off x="0" y="0"/>
+          <a:ext cx="0" cy="0"/>
+          <a:chOff x="0" y="0"/>
+          <a:chExt cx="0" cy="0"/>
+        </a:xfrm>
+      </p:grpSpPr>
+      <p:sp>
+        <p:nvSpPr>
+          <p:cNvPr id="2" name="Title 1">
+            <a:extLst>
+              <a:ext uri="{FF2B5EF4-FFF2-40B4-BE49-F238E27FC236}">
+                <a16:creationId xmlns:a16="http://schemas.microsoft.com/office/drawing/2014/main" id="{0F1952B0-D13C-4902-B329-BAA78235D9D8}"/>
+              </a:ext>
+            </a:extLst>
+          </p:cNvPr>
+          <p:cNvSpPr>
+            <a:spLocks noGrp="1"/>
+          </p:cNvSpPr>
+          <p:nvPr>
+            <p:ph type="title"/>
+          </p:nvPr>
+        </p:nvSpPr>
+        <p:spPr/>
+        <p:txBody>
+          <a:bodyPr/>
+          <a:lstStyle/>
+          <a:p>
+            <a:r>
+              <a:rPr lang="en-US" dirty="0"/>
+              <a:t>Bibliography</a:t>
+            </a:r>
+            <a:endParaRPr lang="en-GB" dirty="0"/>
+          </a:p>
+        </p:txBody>
+      </p:sp>
+      <p:sp>
+        <p:nvSpPr>
+          <p:cNvPr id="3" name="Content Placeholder 2">
+            <a:extLst>
+              <a:ext uri="{FF2B5EF4-FFF2-40B4-BE49-F238E27FC236}">
+                <a16:creationId xmlns:a16="http://schemas.microsoft.com/office/drawing/2014/main" id="{69CF29C1-6E00-4494-BE83-6C3A053B7984}"/>
+              </a:ext>
+            </a:extLst>
+          </p:cNvPr>
+          <p:cNvSpPr>
+            <a:spLocks noGrp="1"/>
+          </p:cNvSpPr>
+          <p:nvPr>
+            <p:ph idx="1"/>
+          </p:nvPr>
+        </p:nvSpPr>
+        <p:spPr/>
+        <p:txBody>
+          <a:bodyPr/>
+          <a:lstStyle/>
+          <a:p>
+            <a:endParaRPr lang="en-GB"/>
+          </a:p>
+        </p:txBody>
+      </p:sp>
+    </p:spTree>
+    <p:extLst>
+      <p:ext uri="{BB962C8B-B14F-4D97-AF65-F5344CB8AC3E}">
+        <p14:creationId xmlns:p14="http://schemas.microsoft.com/office/powerpoint/2010/main" val="800296228"/>
+      </p:ext>
+    </p:extLst>
+  </p:cSld>
+  <p:clrMapOvr>
+    <a:masterClrMapping/>
+  </p:clrMapOvr>
+</p:sld>
+</file>
+
 <file path=ppt/slides/slide2.xml><?xml version="1.0" encoding="utf-8"?>
 <p:sld xmlns:a="http://schemas.openxmlformats.org/drawingml/2006/main" xmlns:r="http://schemas.openxmlformats.org/officeDocument/2006/relationships" xmlns:p="http://schemas.openxmlformats.org/presentationml/2006/main">
   <p:cSld>
@@ -8637,7 +9466,7 @@
           <p:cNvPr id="2" name="Title 1">
             <a:extLst>
               <a:ext uri="{FF2B5EF4-FFF2-40B4-BE49-F238E27FC236}">
-                <a16:creationId xmlns:a16="http://schemas.microsoft.com/office/drawing/2014/main" id="{9BEEDA2E-0A35-427F-A63E-8B183E41664C}"/>
+                <a16:creationId xmlns:a16="http://schemas.microsoft.com/office/drawing/2014/main" id="{FE94B326-36E7-4ADD-AEC8-D34D7ACC3E16}"/>
               </a:ext>
             </a:extLst>
           </p:cNvPr>
@@ -8655,29 +9484,7 @@
           <a:p>
             <a:r>
               <a:rPr lang="en-US" dirty="0"/>
-              <a:t>The </a:t>
-            </a:r>
-            <a:r>
-              <a:rPr lang="en-US" b="0" dirty="0">
-                <a:latin typeface="Consolas" panose="020B0609020204030204" pitchFamily="49" charset="0"/>
-              </a:rPr>
-              <a:t>`</a:t>
-            </a:r>
-            <a:r>
-              <a:rPr lang="en-US" b="0" dirty="0" err="1">
-                <a:latin typeface="Consolas" panose="020B0609020204030204" pitchFamily="49" charset="0"/>
-              </a:rPr>
-              <a:t>media_tools</a:t>
-            </a:r>
-            <a:r>
-              <a:rPr lang="en-US" b="0" dirty="0">
-                <a:latin typeface="Consolas" panose="020B0609020204030204" pitchFamily="49" charset="0"/>
-              </a:rPr>
-              <a:t>`</a:t>
-            </a:r>
-            <a:r>
-              <a:rPr lang="en-US" dirty="0"/>
-              <a:t> package</a:t>
+              <a:t>Media files == arrays of data</a:t>
             </a:r>
             <a:endParaRPr lang="en-GB" dirty="0"/>
           </a:p>
@@ -8688,7 +9495,7 @@
           <p:cNvPr id="3" name="Content Placeholder 2">
             <a:extLst>
               <a:ext uri="{FF2B5EF4-FFF2-40B4-BE49-F238E27FC236}">
-                <a16:creationId xmlns:a16="http://schemas.microsoft.com/office/drawing/2014/main" id="{9BB3C701-FD12-4207-913A-51C0FA960393}"/>
+                <a16:creationId xmlns:a16="http://schemas.microsoft.com/office/drawing/2014/main" id="{BFD9DF7E-E84A-498C-8BA4-6F8A45386028}"/>
               </a:ext>
             </a:extLst>
           </p:cNvPr>
@@ -8704,14 +9511,48 @@
           <a:bodyPr/>
           <a:lstStyle/>
           <a:p>
-            <a:endParaRPr lang="en-GB" dirty="0"/>
+            <a:pPr marL="285750" indent="-285750">
+              <a:buFont typeface="Arial" panose="020B0604020202020204" pitchFamily="34" charset="0"/>
+              <a:buChar char="•"/>
+            </a:pPr>
+            <a:endParaRPr lang="en-US" dirty="0"/>
+          </a:p>
+          <a:p>
+            <a:pPr marL="285750" indent="-285750">
+              <a:buFont typeface="Arial" panose="020B0604020202020204" pitchFamily="34" charset="0"/>
+              <a:buChar char="•"/>
+            </a:pPr>
+            <a:r>
+              <a:rPr lang="en-US" dirty="0"/>
+              <a:t>Image files = 2d or 2d arrays of shape (height, width, channels)</a:t>
+            </a:r>
+          </a:p>
+          <a:p>
+            <a:pPr marL="285750" indent="-285750">
+              <a:buFont typeface="Arial" panose="020B0604020202020204" pitchFamily="34" charset="0"/>
+              <a:buChar char="•"/>
+            </a:pPr>
+            <a:r>
+              <a:rPr lang="en-US" dirty="0"/>
+              <a:t>Audio files = n-dimensional arrays of shape of shape (channel1, channel2…) + a sample rate</a:t>
+            </a:r>
+          </a:p>
+          <a:p>
+            <a:pPr marL="285750" indent="-285750">
+              <a:buFont typeface="Arial" panose="020B0604020202020204" pitchFamily="34" charset="0"/>
+              <a:buChar char="•"/>
+            </a:pPr>
+            <a:r>
+              <a:rPr lang="en-US" dirty="0"/>
+              <a:t>Video files ≈ a list of arrays of images + an audio array</a:t>
+            </a:r>
           </a:p>
         </p:txBody>
       </p:sp>
     </p:spTree>
     <p:extLst>
       <p:ext uri="{BB962C8B-B14F-4D97-AF65-F5344CB8AC3E}">
-        <p14:creationId xmlns:p14="http://schemas.microsoft.com/office/powerpoint/2010/main" val="1837331357"/>
+        <p14:creationId xmlns:p14="http://schemas.microsoft.com/office/powerpoint/2010/main" val="4018356292"/>
       </p:ext>
     </p:extLst>
   </p:cSld>
@@ -8743,7 +9584,7 @@
           <p:cNvPr id="2" name="Title 1">
             <a:extLst>
               <a:ext uri="{FF2B5EF4-FFF2-40B4-BE49-F238E27FC236}">
-                <a16:creationId xmlns:a16="http://schemas.microsoft.com/office/drawing/2014/main" id="{ACBE1B1C-3144-49CA-A5B0-24B30F42604D}"/>
+                <a16:creationId xmlns:a16="http://schemas.microsoft.com/office/drawing/2014/main" id="{B49D4D18-2245-48C0-B872-6425DEFBDBC7}"/>
               </a:ext>
             </a:extLst>
           </p:cNvPr>
@@ -8763,7 +9604,7 @@
           <a:p>
             <a:r>
               <a:rPr lang="en-US" dirty="0"/>
-              <a:t>Reading digital media files with Python</a:t>
+              <a:t>N-dimensional arrays = n-dimensional arrays subdivided N-n times</a:t>
             </a:r>
             <a:endParaRPr lang="en-GB" dirty="0"/>
           </a:p>
@@ -8774,7 +9615,7 @@
           <p:cNvPr id="3" name="Content Placeholder 2">
             <a:extLst>
               <a:ext uri="{FF2B5EF4-FFF2-40B4-BE49-F238E27FC236}">
-                <a16:creationId xmlns:a16="http://schemas.microsoft.com/office/drawing/2014/main" id="{B5F69D01-6A81-4DCB-A4F4-08655E584F4B}"/>
+                <a16:creationId xmlns:a16="http://schemas.microsoft.com/office/drawing/2014/main" id="{FF983CBB-0E98-4F2C-B224-9A736A36A4BF}"/>
               </a:ext>
             </a:extLst>
           </p:cNvPr>
@@ -8787,33 +9628,63 @@
         </p:nvSpPr>
         <p:spPr/>
         <p:txBody>
-          <a:bodyPr/>
+          <a:bodyPr>
+            <a:normAutofit fontScale="85000" lnSpcReduction="10000"/>
+          </a:bodyPr>
           <a:lstStyle/>
           <a:p>
             <a:r>
               <a:rPr lang="en-US" dirty="0"/>
-              <a:t>Audio:</a:t>
-            </a:r>
-          </a:p>
-          <a:p>
+              <a:t>Where N represents a number of dimensions superior to n.</a:t>
+            </a:r>
+          </a:p>
+          <a:p>
+            <a:pPr marL="285750" indent="-285750">
+              <a:buFont typeface="Arial" panose="020B0604020202020204" pitchFamily="34" charset="0"/>
+              <a:buChar char="•"/>
+            </a:pPr>
+            <a:endParaRPr lang="en-US" dirty="0"/>
+          </a:p>
+          <a:p>
+            <a:pPr marL="285750" indent="-285750">
+              <a:buFont typeface="Arial" panose="020B0604020202020204" pitchFamily="34" charset="0"/>
+              <a:buChar char="•"/>
+            </a:pPr>
             <a:r>
               <a:rPr lang="en-US" dirty="0"/>
-              <a:t>Images:</a:t>
-            </a:r>
-          </a:p>
-          <a:p>
+              <a:t>A 1d array can be turned into a 2d array by splitting the dimension of the array into a number of smaller arrays (one division).</a:t>
+            </a:r>
+          </a:p>
+          <a:p>
+            <a:pPr marL="285750" indent="-285750">
+              <a:buFont typeface="Arial" panose="020B0604020202020204" pitchFamily="34" charset="0"/>
+              <a:buChar char="•"/>
+            </a:pPr>
             <a:r>
               <a:rPr lang="en-US" dirty="0"/>
-              <a:t>Text:</a:t>
+              <a:t>A 2d array can be turned into a 3d array by dividing the “deepest” axis of the array into a number of smaller arrays (one division)</a:t>
             </a:r>
             <a:endParaRPr lang="en-GB" dirty="0"/>
+          </a:p>
+          <a:p>
+            <a:pPr marL="285750" indent="-285750">
+              <a:buFont typeface="Arial" panose="020B0604020202020204" pitchFamily="34" charset="0"/>
+              <a:buChar char="•"/>
+            </a:pPr>
+            <a:endParaRPr lang="en-GB" dirty="0"/>
+          </a:p>
+          <a:p>
+            <a:r>
+              <a:rPr lang="en-GB" dirty="0"/>
+              <a:t>To go from a 1d array to a 3d array requires a 2 division of the axis of the 1d array. This principle is generalisable to any number of dimensions.</a:t>
+            </a:r>
           </a:p>
         </p:txBody>
       </p:sp>
     </p:spTree>
     <p:extLst>
       <p:ext uri="{BB962C8B-B14F-4D97-AF65-F5344CB8AC3E}">
-        <p14:creationId xmlns:p14="http://schemas.microsoft.com/office/powerpoint/2010/main" val="139458218"/>
+        <p14:creationId xmlns:p14="http://schemas.microsoft.com/office/powerpoint/2010/main" val="3498716709"/>
       </p:ext>
     </p:extLst>
   </p:cSld>
@@ -8845,7 +9716,7 @@
           <p:cNvPr id="2" name="Title 1">
             <a:extLst>
               <a:ext uri="{FF2B5EF4-FFF2-40B4-BE49-F238E27FC236}">
-                <a16:creationId xmlns:a16="http://schemas.microsoft.com/office/drawing/2014/main" id="{95B23373-EA78-4914-96B0-E5334CFA96B0}"/>
+                <a16:creationId xmlns:a16="http://schemas.microsoft.com/office/drawing/2014/main" id="{9EBD5E98-FED7-4CE2-BF15-9A5F40A9221C}"/>
               </a:ext>
             </a:extLst>
           </p:cNvPr>
@@ -8865,7 +9736,7 @@
           <a:p>
             <a:r>
               <a:rPr lang="en-US" dirty="0"/>
-              <a:t>Writing to digital media files in python</a:t>
+              <a:t>What this means: the number of dimensions doesn’t really matter</a:t>
             </a:r>
             <a:endParaRPr lang="en-GB" dirty="0"/>
           </a:p>
@@ -8876,7 +9747,7 @@
           <p:cNvPr id="3" name="Content Placeholder 2">
             <a:extLst>
               <a:ext uri="{FF2B5EF4-FFF2-40B4-BE49-F238E27FC236}">
-                <a16:creationId xmlns:a16="http://schemas.microsoft.com/office/drawing/2014/main" id="{8F13359D-2D67-4701-82F0-ACF8CA292A1B}"/>
+                <a16:creationId xmlns:a16="http://schemas.microsoft.com/office/drawing/2014/main" id="{621E6B77-CAD1-4257-846A-59A2A173C948}"/>
               </a:ext>
             </a:extLst>
           </p:cNvPr>
@@ -8889,17 +9760,37 @@
         </p:nvSpPr>
         <p:spPr/>
         <p:txBody>
-          <a:bodyPr/>
+          <a:bodyPr>
+            <a:normAutofit/>
+          </a:bodyPr>
           <a:lstStyle/>
           <a:p>
-            <a:endParaRPr lang="en-GB"/>
+            <a:endParaRPr lang="en-US" dirty="0"/>
+          </a:p>
+          <a:p>
+            <a:endParaRPr lang="en-US" dirty="0"/>
+          </a:p>
+          <a:p>
+            <a:r>
+              <a:rPr lang="en-US" dirty="0"/>
+              <a:t>For our purposes, we can edit audio or image arrays using the same tools. </a:t>
+            </a:r>
+          </a:p>
+          <a:p>
+            <a:endParaRPr lang="en-US" dirty="0"/>
+          </a:p>
+          <a:p>
+            <a:r>
+              <a:rPr lang="en-US" sz="1200" dirty="0"/>
+              <a:t>*This does not extent to video because videos are more analogous to lists: they contain arrays of different types and different sizes, which contrary to variances in the number of dimensions, makes our life a little harder. </a:t>
+            </a:r>
           </a:p>
         </p:txBody>
       </p:sp>
     </p:spTree>
     <p:extLst>
       <p:ext uri="{BB962C8B-B14F-4D97-AF65-F5344CB8AC3E}">
-        <p14:creationId xmlns:p14="http://schemas.microsoft.com/office/powerpoint/2010/main" val="1625841291"/>
+        <p14:creationId xmlns:p14="http://schemas.microsoft.com/office/powerpoint/2010/main" val="2719106918"/>
       </p:ext>
     </p:extLst>
   </p:cSld>
@@ -8931,7 +9822,7 @@
           <p:cNvPr id="2" name="Title 1">
             <a:extLst>
               <a:ext uri="{FF2B5EF4-FFF2-40B4-BE49-F238E27FC236}">
-                <a16:creationId xmlns:a16="http://schemas.microsoft.com/office/drawing/2014/main" id="{03AAE4B9-6681-4B89-934A-64149E20BC99}"/>
+                <a16:creationId xmlns:a16="http://schemas.microsoft.com/office/drawing/2014/main" id="{9BEEDA2E-0A35-427F-A63E-8B183E41664C}"/>
               </a:ext>
             </a:extLst>
           </p:cNvPr>
@@ -8944,25 +9835,74 @@
         </p:nvSpPr>
         <p:spPr/>
         <p:txBody>
-          <a:bodyPr>
-            <a:normAutofit fontScale="90000"/>
-          </a:bodyPr>
+          <a:bodyPr/>
           <a:lstStyle/>
           <a:p>
             <a:r>
               <a:rPr lang="en-US" dirty="0"/>
-              <a:t>Editing data from media files in Python</a:t>
+              <a:t>The </a:t>
+            </a:r>
+            <a:r>
+              <a:rPr lang="en-US" b="0" dirty="0">
+                <a:latin typeface="Consolas" panose="020B0609020204030204" pitchFamily="49" charset="0"/>
+              </a:rPr>
+              <a:t>`</a:t>
+            </a:r>
+            <a:r>
+              <a:rPr lang="en-US" b="0" dirty="0" err="1">
+                <a:latin typeface="Consolas" panose="020B0609020204030204" pitchFamily="49" charset="0"/>
+              </a:rPr>
+              <a:t>media_tools</a:t>
+            </a:r>
+            <a:r>
+              <a:rPr lang="en-US" b="0" dirty="0">
+                <a:latin typeface="Consolas" panose="020B0609020204030204" pitchFamily="49" charset="0"/>
+              </a:rPr>
+              <a:t>`</a:t>
+            </a:r>
+            <a:r>
+              <a:rPr lang="en-US" dirty="0"/>
+              <a:t> package</a:t>
             </a:r>
             <a:endParaRPr lang="en-GB" dirty="0"/>
           </a:p>
         </p:txBody>
       </p:sp>
+      <p:pic>
+        <p:nvPicPr>
+          <p:cNvPr id="10" name="Content Placeholder 9">
+            <a:extLst>
+              <a:ext uri="{FF2B5EF4-FFF2-40B4-BE49-F238E27FC236}">
+                <a16:creationId xmlns:a16="http://schemas.microsoft.com/office/drawing/2014/main" id="{DF6BD78E-4E81-478C-9951-B7A022AF2FD4}"/>
+              </a:ext>
+            </a:extLst>
+          </p:cNvPr>
+          <p:cNvPicPr>
+            <a:picLocks noGrp="1" noChangeAspect="1"/>
+          </p:cNvPicPr>
+          <p:nvPr>
+            <p:ph sz="half" idx="2"/>
+          </p:nvPr>
+        </p:nvPicPr>
+        <p:blipFill>
+          <a:blip r:embed="rId3"/>
+          <a:stretch>
+            <a:fillRect/>
+          </a:stretch>
+        </p:blipFill>
+        <p:spPr>
+          <a:xfrm>
+            <a:off x="6981825" y="2962275"/>
+            <a:ext cx="3257550" cy="2609850"/>
+          </a:xfrm>
+        </p:spPr>
+      </p:pic>
       <p:sp>
         <p:nvSpPr>
-          <p:cNvPr id="3" name="Content Placeholder 2">
+          <p:cNvPr id="8" name="Content Placeholder 7">
             <a:extLst>
               <a:ext uri="{FF2B5EF4-FFF2-40B4-BE49-F238E27FC236}">
-                <a16:creationId xmlns:a16="http://schemas.microsoft.com/office/drawing/2014/main" id="{81EFAE41-54A8-413D-A152-83309598AEB1}"/>
+                <a16:creationId xmlns:a16="http://schemas.microsoft.com/office/drawing/2014/main" id="{44D61CB9-D485-40CF-9675-43D4E2EC3123}"/>
               </a:ext>
             </a:extLst>
           </p:cNvPr>
@@ -8970,7 +9910,7 @@
             <a:spLocks noGrp="1"/>
           </p:cNvSpPr>
           <p:nvPr>
-            <p:ph idx="1"/>
+            <p:ph sz="half" idx="1"/>
           </p:nvPr>
         </p:nvSpPr>
         <p:spPr/>
@@ -8978,14 +9918,61 @@
           <a:bodyPr/>
           <a:lstStyle/>
           <a:p>
-            <a:endParaRPr lang="en-GB"/>
+            <a:r>
+              <a:rPr lang="en-US" dirty="0"/>
+              <a:t>Data can be </a:t>
+            </a:r>
+          </a:p>
+          <a:p>
+            <a:pPr marL="285750" indent="-285750">
+              <a:buFont typeface="Arial" panose="020B0604020202020204" pitchFamily="34" charset="0"/>
+              <a:buChar char="•"/>
+            </a:pPr>
+            <a:r>
+              <a:rPr lang="en-US" dirty="0"/>
+              <a:t>Mapped</a:t>
+            </a:r>
+          </a:p>
+          <a:p>
+            <a:pPr marL="285750" indent="-285750">
+              <a:buFont typeface="Arial" panose="020B0604020202020204" pitchFamily="34" charset="0"/>
+              <a:buChar char="•"/>
+            </a:pPr>
+            <a:r>
+              <a:rPr lang="en-US" dirty="0"/>
+              <a:t>Transformed</a:t>
+            </a:r>
+          </a:p>
+          <a:p>
+            <a:pPr marL="285750" indent="-285750">
+              <a:buFont typeface="Arial" panose="020B0604020202020204" pitchFamily="34" charset="0"/>
+              <a:buChar char="•"/>
+            </a:pPr>
+            <a:r>
+              <a:rPr lang="en-US" dirty="0"/>
+              <a:t>Generated</a:t>
+            </a:r>
+          </a:p>
+          <a:p>
+            <a:pPr marL="285750" indent="-285750">
+              <a:buFont typeface="Arial" panose="020B0604020202020204" pitchFamily="34" charset="0"/>
+              <a:buChar char="•"/>
+            </a:pPr>
+            <a:r>
+              <a:rPr lang="en-US" dirty="0"/>
+              <a:t>Messed with (transformations, but wacky)</a:t>
+            </a:r>
+            <a:endParaRPr lang="en-GB" dirty="0"/>
+          </a:p>
+          <a:p>
+            <a:endParaRPr lang="en-GB" dirty="0"/>
           </a:p>
         </p:txBody>
       </p:sp>
     </p:spTree>
     <p:extLst>
       <p:ext uri="{BB962C8B-B14F-4D97-AF65-F5344CB8AC3E}">
-        <p14:creationId xmlns:p14="http://schemas.microsoft.com/office/powerpoint/2010/main" val="2054859352"/>
+        <p14:creationId xmlns:p14="http://schemas.microsoft.com/office/powerpoint/2010/main" val="1837331357"/>
       </p:ext>
     </p:extLst>
   </p:cSld>
@@ -9017,7 +10004,7 @@
           <p:cNvPr id="2" name="Title 1">
             <a:extLst>
               <a:ext uri="{FF2B5EF4-FFF2-40B4-BE49-F238E27FC236}">
-                <a16:creationId xmlns:a16="http://schemas.microsoft.com/office/drawing/2014/main" id="{466FE2C7-39EC-48DA-B34E-CF2C31DE34B5}"/>
+                <a16:creationId xmlns:a16="http://schemas.microsoft.com/office/drawing/2014/main" id="{66B5AE33-8A3F-4821-B0F2-38FD6504457D}"/>
               </a:ext>
             </a:extLst>
           </p:cNvPr>
@@ -9028,16 +10015,19 @@
             <p:ph type="title"/>
           </p:nvPr>
         </p:nvSpPr>
-        <p:spPr/>
+        <p:spPr>
+          <a:xfrm>
+            <a:off x="4654296" y="3074744"/>
+            <a:ext cx="6665976" cy="2129674"/>
+          </a:xfrm>
+        </p:spPr>
         <p:txBody>
-          <a:bodyPr>
-            <a:normAutofit fontScale="90000"/>
-          </a:bodyPr>
+          <a:bodyPr/>
           <a:lstStyle/>
           <a:p>
             <a:r>
               <a:rPr lang="en-US" dirty="0"/>
-              <a:t>Generating data for writing to media files in Python</a:t>
+              <a:t>Examples:</a:t>
             </a:r>
             <a:endParaRPr lang="en-GB" dirty="0"/>
           </a:p>
@@ -9045,10 +10035,10 @@
       </p:sp>
       <p:sp>
         <p:nvSpPr>
-          <p:cNvPr id="3" name="Content Placeholder 2">
+          <p:cNvPr id="3" name="Text Placeholder 2">
             <a:extLst>
               <a:ext uri="{FF2B5EF4-FFF2-40B4-BE49-F238E27FC236}">
-                <a16:creationId xmlns:a16="http://schemas.microsoft.com/office/drawing/2014/main" id="{EE07B451-8099-4922-A2A1-4B088D431738}"/>
+                <a16:creationId xmlns:a16="http://schemas.microsoft.com/office/drawing/2014/main" id="{2B1C2606-39A7-4CC1-9CC8-E5458418B221}"/>
               </a:ext>
             </a:extLst>
           </p:cNvPr>
@@ -9056,22 +10046,33 @@
             <a:spLocks noGrp="1"/>
           </p:cNvSpPr>
           <p:nvPr>
-            <p:ph idx="1"/>
+            <p:ph type="body" idx="1"/>
           </p:nvPr>
         </p:nvSpPr>
-        <p:spPr/>
+        <p:spPr>
+          <a:xfrm>
+            <a:off x="4654295" y="5204417"/>
+            <a:ext cx="6665975" cy="912177"/>
+          </a:xfrm>
+        </p:spPr>
         <p:txBody>
-          <a:bodyPr/>
+          <a:bodyPr>
+            <a:normAutofit fontScale="92500" lnSpcReduction="10000"/>
+          </a:bodyPr>
           <a:lstStyle/>
           <a:p>
-            <a:endParaRPr lang="en-GB"/>
+            <a:r>
+              <a:rPr lang="en-US" dirty="0"/>
+              <a:t>Mapping, Transforming, and Generating data to be saved as different media types.</a:t>
+            </a:r>
+            <a:endParaRPr lang="en-GB" dirty="0"/>
           </a:p>
         </p:txBody>
       </p:sp>
     </p:spTree>
     <p:extLst>
       <p:ext uri="{BB962C8B-B14F-4D97-AF65-F5344CB8AC3E}">
-        <p14:creationId xmlns:p14="http://schemas.microsoft.com/office/powerpoint/2010/main" val="70055462"/>
+        <p14:creationId xmlns:p14="http://schemas.microsoft.com/office/powerpoint/2010/main" val="2752075132"/>
       </p:ext>
     </p:extLst>
   </p:cSld>
@@ -9103,7 +10104,7 @@
           <p:cNvPr id="2" name="Title 1">
             <a:extLst>
               <a:ext uri="{FF2B5EF4-FFF2-40B4-BE49-F238E27FC236}">
-                <a16:creationId xmlns:a16="http://schemas.microsoft.com/office/drawing/2014/main" id="{E527C3E5-100C-40BB-9777-6E78F264C1E7}"/>
+                <a16:creationId xmlns:a16="http://schemas.microsoft.com/office/drawing/2014/main" id="{5151E28F-D00F-4D73-8CE6-E61D1F331B68}"/>
               </a:ext>
             </a:extLst>
           </p:cNvPr>
@@ -9121,7 +10122,7 @@
           <a:p>
             <a:r>
               <a:rPr lang="en-US" dirty="0"/>
-              <a:t>How to use this project yourself</a:t>
+              <a:t>Mapping</a:t>
             </a:r>
             <a:endParaRPr lang="en-GB" dirty="0"/>
           </a:p>
@@ -9132,7 +10133,7 @@
           <p:cNvPr id="3" name="Content Placeholder 2">
             <a:extLst>
               <a:ext uri="{FF2B5EF4-FFF2-40B4-BE49-F238E27FC236}">
-                <a16:creationId xmlns:a16="http://schemas.microsoft.com/office/drawing/2014/main" id="{78FEA772-4CF4-4DE2-84DD-725F4261C70C}"/>
+                <a16:creationId xmlns:a16="http://schemas.microsoft.com/office/drawing/2014/main" id="{BACAA9FA-4437-417F-B8A8-A2FF5FD72EB6}"/>
               </a:ext>
             </a:extLst>
           </p:cNvPr>
@@ -9155,7 +10156,7 @@
     </p:spTree>
     <p:extLst>
       <p:ext uri="{BB962C8B-B14F-4D97-AF65-F5344CB8AC3E}">
-        <p14:creationId xmlns:p14="http://schemas.microsoft.com/office/powerpoint/2010/main" val="307629117"/>
+        <p14:creationId xmlns:p14="http://schemas.microsoft.com/office/powerpoint/2010/main" val="2826049393"/>
       </p:ext>
     </p:extLst>
   </p:cSld>
@@ -9187,7 +10188,7 @@
           <p:cNvPr id="2" name="Title 1">
             <a:extLst>
               <a:ext uri="{FF2B5EF4-FFF2-40B4-BE49-F238E27FC236}">
-                <a16:creationId xmlns:a16="http://schemas.microsoft.com/office/drawing/2014/main" id="{0F1952B0-D13C-4902-B329-BAA78235D9D8}"/>
+                <a16:creationId xmlns:a16="http://schemas.microsoft.com/office/drawing/2014/main" id="{39733FD3-3D32-42D0-BCC7-543B3C552531}"/>
               </a:ext>
             </a:extLst>
           </p:cNvPr>
@@ -9205,7 +10206,7 @@
           <a:p>
             <a:r>
               <a:rPr lang="en-US" dirty="0"/>
-              <a:t>Bibliography</a:t>
+              <a:t>Transformations</a:t>
             </a:r>
             <a:endParaRPr lang="en-GB" dirty="0"/>
           </a:p>
@@ -9216,7 +10217,7 @@
           <p:cNvPr id="3" name="Content Placeholder 2">
             <a:extLst>
               <a:ext uri="{FF2B5EF4-FFF2-40B4-BE49-F238E27FC236}">
-                <a16:creationId xmlns:a16="http://schemas.microsoft.com/office/drawing/2014/main" id="{69CF29C1-6E00-4494-BE83-6C3A053B7984}"/>
+                <a16:creationId xmlns:a16="http://schemas.microsoft.com/office/drawing/2014/main" id="{3DB4618E-7606-40C9-A2A0-1498D521732F}"/>
               </a:ext>
             </a:extLst>
           </p:cNvPr>
@@ -9239,7 +10240,7 @@
     </p:spTree>
     <p:extLst>
       <p:ext uri="{BB962C8B-B14F-4D97-AF65-F5344CB8AC3E}">
-        <p14:creationId xmlns:p14="http://schemas.microsoft.com/office/powerpoint/2010/main" val="800296228"/>
+        <p14:creationId xmlns:p14="http://schemas.microsoft.com/office/powerpoint/2010/main" val="835188760"/>
       </p:ext>
     </p:extLst>
   </p:cSld>
@@ -9430,4 +10431,299 @@
     </a:ext>
   </a:extLst>
 </a:theme>
+</file>
+
+<file path=ppt/theme/theme2.xml><?xml version="1.0" encoding="utf-8"?>
+<a:theme xmlns:a="http://schemas.openxmlformats.org/drawingml/2006/main" name="Office Theme">
+  <a:themeElements>
+    <a:clrScheme name="Office">
+      <a:dk1>
+        <a:sysClr val="windowText" lastClr="000000"/>
+      </a:dk1>
+      <a:lt1>
+        <a:sysClr val="window" lastClr="FFFFFF"/>
+      </a:lt1>
+      <a:dk2>
+        <a:srgbClr val="44546A"/>
+      </a:dk2>
+      <a:lt2>
+        <a:srgbClr val="E7E6E6"/>
+      </a:lt2>
+      <a:accent1>
+        <a:srgbClr val="4472C4"/>
+      </a:accent1>
+      <a:accent2>
+        <a:srgbClr val="ED7D31"/>
+      </a:accent2>
+      <a:accent3>
+        <a:srgbClr val="A5A5A5"/>
+      </a:accent3>
+      <a:accent4>
+        <a:srgbClr val="FFC000"/>
+      </a:accent4>
+      <a:accent5>
+        <a:srgbClr val="5B9BD5"/>
+      </a:accent5>
+      <a:accent6>
+        <a:srgbClr val="70AD47"/>
+      </a:accent6>
+      <a:hlink>
+        <a:srgbClr val="0563C1"/>
+      </a:hlink>
+      <a:folHlink>
+        <a:srgbClr val="954F72"/>
+      </a:folHlink>
+    </a:clrScheme>
+    <a:fontScheme name="Office">
+      <a:majorFont>
+        <a:latin typeface="Calibri Light" panose="020F0302020204030204"/>
+        <a:ea typeface=""/>
+        <a:cs typeface=""/>
+        <a:font script="Jpan" typeface="游ゴシック Light"/>
+        <a:font script="Hang" typeface="맑은 고딕"/>
+        <a:font script="Hans" typeface="等线 Light"/>
+        <a:font script="Hant" typeface="新細明體"/>
+        <a:font script="Arab" typeface="Times New Roman"/>
+        <a:font script="Hebr" typeface="Times New Roman"/>
+        <a:font script="Thai" typeface="Angsana New"/>
+        <a:font script="Ethi" typeface="Nyala"/>
+        <a:font script="Beng" typeface="Vrinda"/>
+        <a:font script="Gujr" typeface="Shruti"/>
+        <a:font script="Khmr" typeface="MoolBoran"/>
+        <a:font script="Knda" typeface="Tunga"/>
+        <a:font script="Guru" typeface="Raavi"/>
+        <a:font script="Cans" typeface="Euphemia"/>
+        <a:font script="Cher" typeface="Plantagenet Cherokee"/>
+        <a:font script="Yiii" typeface="Microsoft Yi Baiti"/>
+        <a:font script="Tibt" typeface="Microsoft Himalaya"/>
+        <a:font script="Thaa" typeface="MV Boli"/>
+        <a:font script="Deva" typeface="Mangal"/>
+        <a:font script="Telu" typeface="Gautami"/>
+        <a:font script="Taml" typeface="Latha"/>
+        <a:font script="Syrc" typeface="Estrangelo Edessa"/>
+        <a:font script="Orya" typeface="Kalinga"/>
+        <a:font script="Mlym" typeface="Kartika"/>
+        <a:font script="Laoo" typeface="DokChampa"/>
+        <a:font script="Sinh" typeface="Iskoola Pota"/>
+        <a:font script="Mong" typeface="Mongolian Baiti"/>
+        <a:font script="Viet" typeface="Times New Roman"/>
+        <a:font script="Uigh" typeface="Microsoft Uighur"/>
+        <a:font script="Geor" typeface="Sylfaen"/>
+        <a:font script="Armn" typeface="Arial"/>
+        <a:font script="Bugi" typeface="Leelawadee UI"/>
+        <a:font script="Bopo" typeface="Microsoft JhengHei"/>
+        <a:font script="Java" typeface="Javanese Text"/>
+        <a:font script="Lisu" typeface="Segoe UI"/>
+        <a:font script="Mymr" typeface="Myanmar Text"/>
+        <a:font script="Nkoo" typeface="Ebrima"/>
+        <a:font script="Olck" typeface="Nirmala UI"/>
+        <a:font script="Osma" typeface="Ebrima"/>
+        <a:font script="Phag" typeface="Phagspa"/>
+        <a:font script="Syrn" typeface="Estrangelo Edessa"/>
+        <a:font script="Syrj" typeface="Estrangelo Edessa"/>
+        <a:font script="Syre" typeface="Estrangelo Edessa"/>
+        <a:font script="Sora" typeface="Nirmala UI"/>
+        <a:font script="Tale" typeface="Microsoft Tai Le"/>
+        <a:font script="Talu" typeface="Microsoft New Tai Lue"/>
+        <a:font script="Tfng" typeface="Ebrima"/>
+      </a:majorFont>
+      <a:minorFont>
+        <a:latin typeface="Calibri" panose="020F0502020204030204"/>
+        <a:ea typeface=""/>
+        <a:cs typeface=""/>
+        <a:font script="Jpan" typeface="游ゴシック"/>
+        <a:font script="Hang" typeface="맑은 고딕"/>
+        <a:font script="Hans" typeface="等线"/>
+        <a:font script="Hant" typeface="新細明體"/>
+        <a:font script="Arab" typeface="Arial"/>
+        <a:font script="Hebr" typeface="Arial"/>
+        <a:font script="Thai" typeface="Cordia New"/>
+        <a:font script="Ethi" typeface="Nyala"/>
+        <a:font script="Beng" typeface="Vrinda"/>
+        <a:font script="Gujr" typeface="Shruti"/>
+        <a:font script="Khmr" typeface="DaunPenh"/>
+        <a:font script="Knda" typeface="Tunga"/>
+        <a:font script="Guru" typeface="Raavi"/>
+        <a:font script="Cans" typeface="Euphemia"/>
+        <a:font script="Cher" typeface="Plantagenet Cherokee"/>
+        <a:font script="Yiii" typeface="Microsoft Yi Baiti"/>
+        <a:font script="Tibt" typeface="Microsoft Himalaya"/>
+        <a:font script="Thaa" typeface="MV Boli"/>
+        <a:font script="Deva" typeface="Mangal"/>
+        <a:font script="Telu" typeface="Gautami"/>
+        <a:font script="Taml" typeface="Latha"/>
+        <a:font script="Syrc" typeface="Estrangelo Edessa"/>
+        <a:font script="Orya" typeface="Kalinga"/>
+        <a:font script="Mlym" typeface="Kartika"/>
+        <a:font script="Laoo" typeface="DokChampa"/>
+        <a:font script="Sinh" typeface="Iskoola Pota"/>
+        <a:font script="Mong" typeface="Mongolian Baiti"/>
+        <a:font script="Viet" typeface="Arial"/>
+        <a:font script="Uigh" typeface="Microsoft Uighur"/>
+        <a:font script="Geor" typeface="Sylfaen"/>
+        <a:font script="Armn" typeface="Arial"/>
+        <a:font script="Bugi" typeface="Leelawadee UI"/>
+        <a:font script="Bopo" typeface="Microsoft JhengHei"/>
+        <a:font script="Java" typeface="Javanese Text"/>
+        <a:font script="Lisu" typeface="Segoe UI"/>
+        <a:font script="Mymr" typeface="Myanmar Text"/>
+        <a:font script="Nkoo" typeface="Ebrima"/>
+        <a:font script="Olck" typeface="Nirmala UI"/>
+        <a:font script="Osma" typeface="Ebrima"/>
+        <a:font script="Phag" typeface="Phagspa"/>
+        <a:font script="Syrn" typeface="Estrangelo Edessa"/>
+        <a:font script="Syrj" typeface="Estrangelo Edessa"/>
+        <a:font script="Syre" typeface="Estrangelo Edessa"/>
+        <a:font script="Sora" typeface="Nirmala UI"/>
+        <a:font script="Tale" typeface="Microsoft Tai Le"/>
+        <a:font script="Talu" typeface="Microsoft New Tai Lue"/>
+        <a:font script="Tfng" typeface="Ebrima"/>
+      </a:minorFont>
+    </a:fontScheme>
+    <a:fmtScheme name="Office">
+      <a:fillStyleLst>
+        <a:solidFill>
+          <a:schemeClr val="phClr"/>
+        </a:solidFill>
+        <a:gradFill rotWithShape="1">
+          <a:gsLst>
+            <a:gs pos="0">
+              <a:schemeClr val="phClr">
+                <a:lumMod val="110000"/>
+                <a:satMod val="105000"/>
+                <a:tint val="67000"/>
+              </a:schemeClr>
+            </a:gs>
+            <a:gs pos="50000">
+              <a:schemeClr val="phClr">
+                <a:lumMod val="105000"/>
+                <a:satMod val="103000"/>
+                <a:tint val="73000"/>
+              </a:schemeClr>
+            </a:gs>
+            <a:gs pos="100000">
+              <a:schemeClr val="phClr">
+                <a:lumMod val="105000"/>
+                <a:satMod val="109000"/>
+                <a:tint val="81000"/>
+              </a:schemeClr>
+            </a:gs>
+          </a:gsLst>
+          <a:lin ang="5400000" scaled="0"/>
+        </a:gradFill>
+        <a:gradFill rotWithShape="1">
+          <a:gsLst>
+            <a:gs pos="0">
+              <a:schemeClr val="phClr">
+                <a:satMod val="103000"/>
+                <a:lumMod val="102000"/>
+                <a:tint val="94000"/>
+              </a:schemeClr>
+            </a:gs>
+            <a:gs pos="50000">
+              <a:schemeClr val="phClr">
+                <a:satMod val="110000"/>
+                <a:lumMod val="100000"/>
+                <a:shade val="100000"/>
+              </a:schemeClr>
+            </a:gs>
+            <a:gs pos="100000">
+              <a:schemeClr val="phClr">
+                <a:lumMod val="99000"/>
+                <a:satMod val="120000"/>
+                <a:shade val="78000"/>
+              </a:schemeClr>
+            </a:gs>
+          </a:gsLst>
+          <a:lin ang="5400000" scaled="0"/>
+        </a:gradFill>
+      </a:fillStyleLst>
+      <a:lnStyleLst>
+        <a:ln w="6350" cap="flat" cmpd="sng" algn="ctr">
+          <a:solidFill>
+            <a:schemeClr val="phClr"/>
+          </a:solidFill>
+          <a:prstDash val="solid"/>
+          <a:miter lim="800000"/>
+        </a:ln>
+        <a:ln w="12700" cap="flat" cmpd="sng" algn="ctr">
+          <a:solidFill>
+            <a:schemeClr val="phClr"/>
+          </a:solidFill>
+          <a:prstDash val="solid"/>
+          <a:miter lim="800000"/>
+        </a:ln>
+        <a:ln w="19050" cap="flat" cmpd="sng" algn="ctr">
+          <a:solidFill>
+            <a:schemeClr val="phClr"/>
+          </a:solidFill>
+          <a:prstDash val="solid"/>
+          <a:miter lim="800000"/>
+        </a:ln>
+      </a:lnStyleLst>
+      <a:effectStyleLst>
+        <a:effectStyle>
+          <a:effectLst/>
+        </a:effectStyle>
+        <a:effectStyle>
+          <a:effectLst/>
+        </a:effectStyle>
+        <a:effectStyle>
+          <a:effectLst>
+            <a:outerShdw blurRad="57150" dist="19050" dir="5400000" algn="ctr" rotWithShape="0">
+              <a:srgbClr val="000000">
+                <a:alpha val="63000"/>
+              </a:srgbClr>
+            </a:outerShdw>
+          </a:effectLst>
+        </a:effectStyle>
+      </a:effectStyleLst>
+      <a:bgFillStyleLst>
+        <a:solidFill>
+          <a:schemeClr val="phClr"/>
+        </a:solidFill>
+        <a:solidFill>
+          <a:schemeClr val="phClr">
+            <a:tint val="95000"/>
+            <a:satMod val="170000"/>
+          </a:schemeClr>
+        </a:solidFill>
+        <a:gradFill rotWithShape="1">
+          <a:gsLst>
+            <a:gs pos="0">
+              <a:schemeClr val="phClr">
+                <a:tint val="93000"/>
+                <a:satMod val="150000"/>
+                <a:shade val="98000"/>
+                <a:lumMod val="102000"/>
+              </a:schemeClr>
+            </a:gs>
+            <a:gs pos="50000">
+              <a:schemeClr val="phClr">
+                <a:tint val="98000"/>
+                <a:satMod val="130000"/>
+                <a:shade val="90000"/>
+                <a:lumMod val="103000"/>
+              </a:schemeClr>
+            </a:gs>
+            <a:gs pos="100000">
+              <a:schemeClr val="phClr">
+                <a:shade val="63000"/>
+                <a:satMod val="120000"/>
+              </a:schemeClr>
+            </a:gs>
+          </a:gsLst>
+          <a:lin ang="5400000" scaled="0"/>
+        </a:gradFill>
+      </a:bgFillStyleLst>
+    </a:fmtScheme>
+  </a:themeElements>
+  <a:objectDefaults/>
+  <a:extraClrSchemeLst/>
+  <a:extLst>
+    <a:ext uri="{05A4C25C-085E-4340-85A3-A5531E510DB2}">
+      <thm15:themeFamily xmlns:thm15="http://schemas.microsoft.com/office/thememl/2012/main" name="Office Theme" id="{62F939B6-93AF-4DB8-9C6B-D6C7DFDC589F}" vid="{4A3C46E8-61CC-4603-A589-7422A47A8E4A}"/>
+    </a:ext>
+  </a:extLst>
+</a:theme>
 </file>
</xml_diff>